<commit_message>
add HRSL for ROI selection
</commit_message>
<xml_diff>
--- a/report/SHAFTS_DL4GEEl_230208.pptx
+++ b/report/SHAFTS_DL4GEEl_230208.pptx
@@ -230,7 +230,7 @@
           <a:p>
             <a:fld id="{63B63D02-CACD-0241-9050-B4B721BFA116}" type="datetimeFigureOut">
               <a:rPr kumimoji="1" lang="zh-CN" altLang="en-US" smtClean="0"/>
-              <a:t>2023/2/8</a:t>
+              <a:t>2023/2/9</a:t>
             </a:fld>
             <a:endParaRPr kumimoji="1" lang="zh-CN" altLang="en-US"/>
           </a:p>
@@ -395,7 +395,7 @@
           <a:p>
             <a:fld id="{AED0E86F-A77D-4996-94AA-10682890A185}" type="datetimeFigureOut">
               <a:rPr lang="zh-CN" altLang="en-US" smtClean="0"/>
-              <a:t>2023/2/8</a:t>
+              <a:t>2023/2/9</a:t>
             </a:fld>
             <a:endParaRPr lang="zh-CN" altLang="en-US"/>
           </a:p>
@@ -1043,7 +1043,7 @@
           <a:p>
             <a:fld id="{A65568B3-6844-9A4D-9FDA-85348DB607B1}" type="datetime1">
               <a:rPr lang="en-US" altLang="zh-CN" smtClean="0"/>
-              <a:t>2/8/23</a:t>
+              <a:t>2/9/23</a:t>
             </a:fld>
             <a:endParaRPr lang="zh-CN" altLang="en-US"/>
           </a:p>
@@ -1453,7 +1453,7 @@
           <a:p>
             <a:fld id="{EE29E6DF-8EA6-3545-B010-72AC5528FD90}" type="datetime1">
               <a:rPr lang="en-US" altLang="zh-CN" smtClean="0"/>
-              <a:t>2/8/23</a:t>
+              <a:t>2/9/23</a:t>
             </a:fld>
             <a:endParaRPr lang="zh-CN" altLang="en-US"/>
           </a:p>
@@ -1616,7 +1616,7 @@
           <a:p>
             <a:fld id="{F920402F-84B6-3B48-973E-A62DB06FC8EA}" type="datetime1">
               <a:rPr lang="en-US" altLang="zh-CN" smtClean="0"/>
-              <a:t>2/8/23</a:t>
+              <a:t>2/9/23</a:t>
             </a:fld>
             <a:endParaRPr lang="zh-CN" altLang="en-US"/>
           </a:p>
@@ -1789,7 +1789,7 @@
           <a:p>
             <a:fld id="{BB00F4CA-7C5D-5E44-B22E-705A0F5028F2}" type="datetime1">
               <a:rPr lang="en-US" altLang="zh-CN" smtClean="0"/>
-              <a:t>2/8/23</a:t>
+              <a:t>2/9/23</a:t>
             </a:fld>
             <a:endParaRPr lang="zh-CN" altLang="en-US"/>
           </a:p>
@@ -1952,7 +1952,7 @@
           <a:p>
             <a:fld id="{643375C9-F4A2-6E40-8ED0-A43DE94C74D2}" type="datetime1">
               <a:rPr lang="en-US" altLang="zh-CN" smtClean="0"/>
-              <a:t>2/8/23</a:t>
+              <a:t>2/9/23</a:t>
             </a:fld>
             <a:endParaRPr lang="zh-CN" altLang="en-US"/>
           </a:p>
@@ -2352,7 +2352,7 @@
           <a:p>
             <a:fld id="{A1BF177B-9694-5743-A1DC-4DEDF37E1A1D}" type="datetime1">
               <a:rPr lang="en-US" altLang="zh-CN" smtClean="0"/>
-              <a:t>2/8/23</a:t>
+              <a:t>2/9/23</a:t>
             </a:fld>
             <a:endParaRPr lang="zh-CN" altLang="en-US"/>
           </a:p>
@@ -2592,7 +2592,7 @@
           <a:p>
             <a:fld id="{A1BF177B-9694-5743-A1DC-4DEDF37E1A1D}" type="datetime1">
               <a:rPr lang="en-US" altLang="zh-CN" smtClean="0"/>
-              <a:t>2/8/23</a:t>
+              <a:t>2/9/23</a:t>
             </a:fld>
             <a:endParaRPr lang="zh-CN" altLang="en-US"/>
           </a:p>
@@ -2816,7 +2816,7 @@
           <a:p>
             <a:fld id="{869F2742-DD1C-EA45-A9A9-1CA2FE0C07E9}" type="datetime1">
               <a:rPr lang="en-US" altLang="zh-CN" smtClean="0"/>
-              <a:t>2/8/23</a:t>
+              <a:t>2/9/23</a:t>
             </a:fld>
             <a:endParaRPr lang="zh-CN" altLang="en-US"/>
           </a:p>
@@ -3175,7 +3175,7 @@
           <a:p>
             <a:fld id="{457B6622-6E4D-CF4D-9D25-1D363121F381}" type="datetime1">
               <a:rPr lang="en-US" altLang="zh-CN" smtClean="0"/>
-              <a:t>2/8/23</a:t>
+              <a:t>2/9/23</a:t>
             </a:fld>
             <a:endParaRPr lang="zh-CN" altLang="en-US"/>
           </a:p>
@@ -3287,7 +3287,7 @@
           <a:p>
             <a:fld id="{01704389-B582-D74C-991F-68953D14C30B}" type="datetime1">
               <a:rPr lang="en-US" altLang="zh-CN" smtClean="0"/>
-              <a:t>2/8/23</a:t>
+              <a:t>2/9/23</a:t>
             </a:fld>
             <a:endParaRPr lang="zh-CN" altLang="en-US"/>
           </a:p>
@@ -3377,7 +3377,7 @@
           <a:p>
             <a:fld id="{F0D6F4E2-1701-D94B-8202-235C189A75C5}" type="datetime1">
               <a:rPr lang="en-US" altLang="zh-CN" smtClean="0"/>
-              <a:t>2/8/23</a:t>
+              <a:t>2/9/23</a:t>
             </a:fld>
             <a:endParaRPr lang="zh-CN" altLang="en-US"/>
           </a:p>
@@ -3647,7 +3647,7 @@
           <a:p>
             <a:fld id="{85433742-FA65-A446-A0E8-822D728EE924}" type="datetime1">
               <a:rPr lang="en-US" altLang="zh-CN" smtClean="0"/>
-              <a:t>2/8/23</a:t>
+              <a:t>2/9/23</a:t>
             </a:fld>
             <a:endParaRPr lang="zh-CN" altLang="en-US"/>
           </a:p>
@@ -3853,7 +3853,7 @@
           <a:p>
             <a:fld id="{111459F2-3475-274D-B563-EB6CE7787669}" type="datetime1">
               <a:rPr lang="en-US" altLang="zh-CN" smtClean="0"/>
-              <a:t>2/8/23</a:t>
+              <a:t>2/9/23</a:t>
             </a:fld>
             <a:endParaRPr lang="zh-CN" altLang="en-US"/>
           </a:p>
@@ -8476,10 +8476,10 @@
       </p:grpSpPr>
       <p:sp>
         <p:nvSpPr>
-          <p:cNvPr id="5" name="文本框 4">
+          <p:cNvPr id="2" name="文本框 1">
             <a:extLst>
               <a:ext uri="{FF2B5EF4-FFF2-40B4-BE49-F238E27FC236}">
-                <a16:creationId xmlns:a16="http://schemas.microsoft.com/office/drawing/2014/main" id="{C23D2F4D-BE19-9D12-5908-29DAB88A04AB}"/>
+                <a16:creationId xmlns:a16="http://schemas.microsoft.com/office/drawing/2014/main" id="{A2B05590-1EAA-6F20-9BE8-D7C9E4DDA6DE}"/>
               </a:ext>
             </a:extLst>
           </p:cNvPr>
@@ -8488,7 +8488,7 @@
         </p:nvSpPr>
         <p:spPr>
           <a:xfrm>
-            <a:off x="350660" y="617038"/>
+            <a:off x="350660" y="907986"/>
             <a:ext cx="2813591" cy="1061829"/>
           </a:xfrm>
           <a:prstGeom prst="rect">
@@ -8570,10 +8570,10 @@
       </p:sp>
       <p:sp>
         <p:nvSpPr>
-          <p:cNvPr id="50" name="文本框 49">
+          <p:cNvPr id="3" name="文本框 2">
             <a:extLst>
               <a:ext uri="{FF2B5EF4-FFF2-40B4-BE49-F238E27FC236}">
-                <a16:creationId xmlns:a16="http://schemas.microsoft.com/office/drawing/2014/main" id="{6CEDCE27-7A57-9509-1493-A2F95D0C0C34}"/>
+                <a16:creationId xmlns:a16="http://schemas.microsoft.com/office/drawing/2014/main" id="{C3D378AB-88A3-1D74-5183-0EBEEE300DF6}"/>
               </a:ext>
             </a:extLst>
           </p:cNvPr>
@@ -8582,7 +8582,7 @@
         </p:nvSpPr>
         <p:spPr>
           <a:xfrm>
-            <a:off x="350660" y="4623357"/>
+            <a:off x="350660" y="4914305"/>
             <a:ext cx="3134256" cy="1061829"/>
           </a:xfrm>
           <a:prstGeom prst="rect">
@@ -8655,10 +8655,10 @@
       </p:sp>
       <p:sp>
         <p:nvSpPr>
-          <p:cNvPr id="6" name="右箭头 5">
+          <p:cNvPr id="4" name="右箭头 3">
             <a:extLst>
               <a:ext uri="{FF2B5EF4-FFF2-40B4-BE49-F238E27FC236}">
-                <a16:creationId xmlns:a16="http://schemas.microsoft.com/office/drawing/2014/main" id="{E84573A8-EC2A-BFA4-EE80-E96C7C634DC2}"/>
+                <a16:creationId xmlns:a16="http://schemas.microsoft.com/office/drawing/2014/main" id="{942FA7D9-FF87-CB10-5E34-480C2FA31D2A}"/>
               </a:ext>
             </a:extLst>
           </p:cNvPr>
@@ -8667,7 +8667,7 @@
         </p:nvSpPr>
         <p:spPr>
           <a:xfrm rot="5400000">
-            <a:off x="-476621" y="3017236"/>
+            <a:off x="-476621" y="3308184"/>
             <a:ext cx="2429950" cy="339634"/>
           </a:xfrm>
           <a:prstGeom prst="rightArrow">
@@ -8713,10 +8713,10 @@
       </p:sp>
       <p:sp>
         <p:nvSpPr>
-          <p:cNvPr id="10" name="矩形 9">
+          <p:cNvPr id="7" name="矩形 6">
             <a:extLst>
               <a:ext uri="{FF2B5EF4-FFF2-40B4-BE49-F238E27FC236}">
-                <a16:creationId xmlns:a16="http://schemas.microsoft.com/office/drawing/2014/main" id="{525C154D-6C9A-640D-4679-D5044466C1C2}"/>
+                <a16:creationId xmlns:a16="http://schemas.microsoft.com/office/drawing/2014/main" id="{E96AFC51-0DB6-A038-4F9E-6D9D8BD450BE}"/>
               </a:ext>
             </a:extLst>
           </p:cNvPr>
@@ -8725,7 +8725,7 @@
         </p:nvSpPr>
         <p:spPr>
           <a:xfrm>
-            <a:off x="242760" y="559653"/>
+            <a:off x="242760" y="850601"/>
             <a:ext cx="3134256" cy="1298018"/>
           </a:xfrm>
           <a:prstGeom prst="rect">
@@ -8766,10 +8766,10 @@
       </p:sp>
       <p:pic>
         <p:nvPicPr>
-          <p:cNvPr id="14" name="图片 13">
+          <p:cNvPr id="8" name="图片 7">
             <a:extLst>
               <a:ext uri="{FF2B5EF4-FFF2-40B4-BE49-F238E27FC236}">
-                <a16:creationId xmlns:a16="http://schemas.microsoft.com/office/drawing/2014/main" id="{F3C53246-E05D-F4EA-FF27-7307C4658AFE}"/>
+                <a16:creationId xmlns:a16="http://schemas.microsoft.com/office/drawing/2014/main" id="{46E46506-4F8A-5AC1-25A1-2F5AF27E3A46}"/>
               </a:ext>
             </a:extLst>
           </p:cNvPr>
@@ -8792,7 +8792,7 @@
         </p:blipFill>
         <p:spPr>
           <a:xfrm>
-            <a:off x="962131" y="2305913"/>
+            <a:off x="962131" y="2596861"/>
             <a:ext cx="2310123" cy="2028733"/>
           </a:xfrm>
           <a:prstGeom prst="rect">
@@ -8802,10 +8802,10 @@
       </p:pic>
       <p:sp>
         <p:nvSpPr>
-          <p:cNvPr id="21" name="矩形 20">
+          <p:cNvPr id="9" name="矩形 8">
             <a:extLst>
               <a:ext uri="{FF2B5EF4-FFF2-40B4-BE49-F238E27FC236}">
-                <a16:creationId xmlns:a16="http://schemas.microsoft.com/office/drawing/2014/main" id="{4A69729D-2D67-9C24-52F7-83AC66C8720C}"/>
+                <a16:creationId xmlns:a16="http://schemas.microsoft.com/office/drawing/2014/main" id="{9CE233CF-3782-48DE-7276-909DB13E56D4}"/>
               </a:ext>
             </a:extLst>
           </p:cNvPr>
@@ -8814,7 +8814,7 @@
         </p:nvSpPr>
         <p:spPr>
           <a:xfrm>
-            <a:off x="242760" y="4569895"/>
+            <a:off x="242760" y="4860843"/>
             <a:ext cx="3134256" cy="1168751"/>
           </a:xfrm>
           <a:prstGeom prst="rect">
@@ -8857,10 +8857,10 @@
       </p:sp>
       <p:sp>
         <p:nvSpPr>
-          <p:cNvPr id="31" name="右箭头 30">
+          <p:cNvPr id="11" name="右箭头 10">
             <a:extLst>
               <a:ext uri="{FF2B5EF4-FFF2-40B4-BE49-F238E27FC236}">
-                <a16:creationId xmlns:a16="http://schemas.microsoft.com/office/drawing/2014/main" id="{1CFAC6FC-429D-4CBC-8963-A26F91511863}"/>
+                <a16:creationId xmlns:a16="http://schemas.microsoft.com/office/drawing/2014/main" id="{74F2A277-E8EC-4102-0903-C29D4696C2BD}"/>
               </a:ext>
             </a:extLst>
           </p:cNvPr>
@@ -8869,7 +8869,7 @@
         </p:nvSpPr>
         <p:spPr>
           <a:xfrm>
-            <a:off x="3457757" y="4984453"/>
+            <a:off x="3457757" y="5275401"/>
             <a:ext cx="952561" cy="339634"/>
           </a:xfrm>
           <a:prstGeom prst="rightArrow">
@@ -8915,10 +8915,10 @@
       </p:sp>
       <p:sp>
         <p:nvSpPr>
-          <p:cNvPr id="32" name="右箭头 31">
+          <p:cNvPr id="12" name="右箭头 11">
             <a:extLst>
               <a:ext uri="{FF2B5EF4-FFF2-40B4-BE49-F238E27FC236}">
-                <a16:creationId xmlns:a16="http://schemas.microsoft.com/office/drawing/2014/main" id="{FCC993AD-C526-91DB-B491-B0D7DA055B32}"/>
+                <a16:creationId xmlns:a16="http://schemas.microsoft.com/office/drawing/2014/main" id="{8907822E-C8F8-6CE0-EC19-15C7F6541ACB}"/>
               </a:ext>
             </a:extLst>
           </p:cNvPr>
@@ -8927,7 +8927,7 @@
         </p:nvSpPr>
         <p:spPr>
           <a:xfrm rot="10800000" flipH="1">
-            <a:off x="7963063" y="4984453"/>
+            <a:off x="7963063" y="5275401"/>
             <a:ext cx="888107" cy="339634"/>
           </a:xfrm>
           <a:prstGeom prst="rightArrow">
@@ -8973,10 +8973,10 @@
       </p:sp>
       <p:grpSp>
         <p:nvGrpSpPr>
-          <p:cNvPr id="35" name="组合 34">
+          <p:cNvPr id="13" name="组合 12">
             <a:extLst>
               <a:ext uri="{FF2B5EF4-FFF2-40B4-BE49-F238E27FC236}">
-                <a16:creationId xmlns:a16="http://schemas.microsoft.com/office/drawing/2014/main" id="{40AF2B77-EB00-BF6C-E7D0-2905C7B46677}"/>
+                <a16:creationId xmlns:a16="http://schemas.microsoft.com/office/drawing/2014/main" id="{C2A468E0-158C-AEEC-AEA4-A21ADC218A89}"/>
               </a:ext>
             </a:extLst>
           </p:cNvPr>
@@ -8985,18 +8985,18 @@
         </p:nvGrpSpPr>
         <p:grpSpPr>
           <a:xfrm>
-            <a:off x="4329145" y="559654"/>
-            <a:ext cx="3661077" cy="2527480"/>
-            <a:chOff x="7406909" y="3732821"/>
-            <a:chExt cx="3661077" cy="2527480"/>
+            <a:off x="3752129" y="2359422"/>
+            <a:ext cx="7294318" cy="1298018"/>
+            <a:chOff x="7379201" y="4962282"/>
+            <a:chExt cx="7294318" cy="1298018"/>
           </a:xfrm>
         </p:grpSpPr>
         <p:sp>
           <p:nvSpPr>
-            <p:cNvPr id="27" name="文本框 26">
+            <p:cNvPr id="15" name="文本框 14">
               <a:extLst>
                 <a:ext uri="{FF2B5EF4-FFF2-40B4-BE49-F238E27FC236}">
-                  <a16:creationId xmlns:a16="http://schemas.microsoft.com/office/drawing/2014/main" id="{897F3F41-70C2-ADA6-FAF4-0C2F8BE06E76}"/>
+                  <a16:creationId xmlns:a16="http://schemas.microsoft.com/office/drawing/2014/main" id="{5C5FF23A-FDA7-A6DA-2852-4CC8571394A9}"/>
                 </a:ext>
               </a:extLst>
             </p:cNvPr>
@@ -9005,7 +9005,7 @@
           </p:nvSpPr>
           <p:spPr>
             <a:xfrm>
-              <a:off x="7560383" y="3946325"/>
+              <a:off x="11156333" y="5155837"/>
               <a:ext cx="3480444" cy="784830"/>
             </a:xfrm>
             <a:prstGeom prst="rect">
@@ -9084,10 +9084,10 @@
         </p:sp>
         <p:sp>
           <p:nvSpPr>
-            <p:cNvPr id="28" name="矩形 27">
+            <p:cNvPr id="16" name="矩形 15">
               <a:extLst>
                 <a:ext uri="{FF2B5EF4-FFF2-40B4-BE49-F238E27FC236}">
-                  <a16:creationId xmlns:a16="http://schemas.microsoft.com/office/drawing/2014/main" id="{FF994559-F729-F1C1-6A66-4920960E5219}"/>
+                  <a16:creationId xmlns:a16="http://schemas.microsoft.com/office/drawing/2014/main" id="{64BB28ED-A389-3AF3-0623-349BEBEC6124}"/>
                 </a:ext>
               </a:extLst>
             </p:cNvPr>
@@ -9096,7 +9096,7 @@
           </p:nvSpPr>
           <p:spPr>
             <a:xfrm>
-              <a:off x="7550499" y="3892863"/>
+              <a:off x="11146449" y="5102375"/>
               <a:ext cx="3380731" cy="972603"/>
             </a:xfrm>
             <a:prstGeom prst="rect">
@@ -9137,10 +9137,10 @@
         </p:sp>
         <p:sp>
           <p:nvSpPr>
-            <p:cNvPr id="29" name="文本框 28">
+            <p:cNvPr id="17" name="文本框 16">
               <a:extLst>
                 <a:ext uri="{FF2B5EF4-FFF2-40B4-BE49-F238E27FC236}">
-                  <a16:creationId xmlns:a16="http://schemas.microsoft.com/office/drawing/2014/main" id="{9E1C16A9-7C7A-2196-B4BF-57B2260E9AFD}"/>
+                  <a16:creationId xmlns:a16="http://schemas.microsoft.com/office/drawing/2014/main" id="{EBBF0B21-BFFF-DBB7-5315-129582086A96}"/>
                 </a:ext>
               </a:extLst>
             </p:cNvPr>
@@ -9220,10 +9220,10 @@
         </p:sp>
         <p:sp>
           <p:nvSpPr>
-            <p:cNvPr id="30" name="矩形 29">
+            <p:cNvPr id="18" name="矩形 17">
               <a:extLst>
                 <a:ext uri="{FF2B5EF4-FFF2-40B4-BE49-F238E27FC236}">
-                  <a16:creationId xmlns:a16="http://schemas.microsoft.com/office/drawing/2014/main" id="{263C70C7-7880-86E6-CFCD-35F3CF34C9C5}"/>
+                  <a16:creationId xmlns:a16="http://schemas.microsoft.com/office/drawing/2014/main" id="{29870C59-D0CE-48B1-DFDE-3267BA0529AA}"/>
                 </a:ext>
               </a:extLst>
             </p:cNvPr>
@@ -9273,10 +9273,10 @@
         </p:sp>
         <p:sp>
           <p:nvSpPr>
-            <p:cNvPr id="33" name="矩形 32">
+            <p:cNvPr id="19" name="矩形 18">
               <a:extLst>
                 <a:ext uri="{FF2B5EF4-FFF2-40B4-BE49-F238E27FC236}">
-                  <a16:creationId xmlns:a16="http://schemas.microsoft.com/office/drawing/2014/main" id="{37D5AAC6-97F8-2984-C018-4F923E1B7B8C}"/>
+                  <a16:creationId xmlns:a16="http://schemas.microsoft.com/office/drawing/2014/main" id="{A8166CAE-4E3C-F1E8-3087-E8E5029EAF48}"/>
                 </a:ext>
               </a:extLst>
             </p:cNvPr>
@@ -9285,8 +9285,8 @@
           </p:nvSpPr>
           <p:spPr>
             <a:xfrm>
-              <a:off x="7406909" y="3732821"/>
-              <a:ext cx="3661077" cy="2527480"/>
+              <a:off x="7379201" y="4962282"/>
+              <a:ext cx="7294318" cy="1298018"/>
             </a:xfrm>
             <a:prstGeom prst="rect">
               <a:avLst/>
@@ -9336,10 +9336,10 @@
       </p:grpSp>
       <p:sp>
         <p:nvSpPr>
-          <p:cNvPr id="34" name="右箭头 33">
+          <p:cNvPr id="20" name="右箭头 19">
             <a:extLst>
               <a:ext uri="{FF2B5EF4-FFF2-40B4-BE49-F238E27FC236}">
-                <a16:creationId xmlns:a16="http://schemas.microsoft.com/office/drawing/2014/main" id="{172E013F-63B1-6800-7D88-7C62F1FDCE17}"/>
+                <a16:creationId xmlns:a16="http://schemas.microsoft.com/office/drawing/2014/main" id="{AD23383E-648C-7297-F1A5-3A667A593C33}"/>
               </a:ext>
             </a:extLst>
           </p:cNvPr>
@@ -9348,8 +9348,8 @@
         </p:nvSpPr>
         <p:spPr>
           <a:xfrm rot="5400000">
-            <a:off x="5834772" y="3380060"/>
-            <a:ext cx="649821" cy="339634"/>
+            <a:off x="5924001" y="3815654"/>
+            <a:ext cx="471363" cy="339634"/>
           </a:xfrm>
           <a:prstGeom prst="rightArrow">
             <a:avLst/>
@@ -9394,10 +9394,10 @@
       </p:sp>
       <p:sp>
         <p:nvSpPr>
-          <p:cNvPr id="36" name="矩形 35">
+          <p:cNvPr id="22" name="矩形 21">
             <a:extLst>
               <a:ext uri="{FF2B5EF4-FFF2-40B4-BE49-F238E27FC236}">
-                <a16:creationId xmlns:a16="http://schemas.microsoft.com/office/drawing/2014/main" id="{740C05FB-07BB-076E-A351-5C1142083BA2}"/>
+                <a16:creationId xmlns:a16="http://schemas.microsoft.com/office/drawing/2014/main" id="{8B0358EE-8841-3256-6D28-5EB0717F3312}"/>
               </a:ext>
             </a:extLst>
           </p:cNvPr>
@@ -9406,7 +9406,7 @@
         </p:nvSpPr>
         <p:spPr>
           <a:xfrm>
-            <a:off x="4472736" y="4001533"/>
+            <a:off x="4472736" y="4292481"/>
             <a:ext cx="3390614" cy="1774436"/>
           </a:xfrm>
           <a:prstGeom prst="rect">
@@ -9447,10 +9447,10 @@
       </p:sp>
       <p:sp>
         <p:nvSpPr>
-          <p:cNvPr id="37" name="文本框 36">
+          <p:cNvPr id="23" name="文本框 22">
             <a:extLst>
               <a:ext uri="{FF2B5EF4-FFF2-40B4-BE49-F238E27FC236}">
-                <a16:creationId xmlns:a16="http://schemas.microsoft.com/office/drawing/2014/main" id="{C508A18E-5D28-FAAA-2231-1C6E33457DDB}"/>
+                <a16:creationId xmlns:a16="http://schemas.microsoft.com/office/drawing/2014/main" id="{CE819CA7-AD96-8624-496E-F5F0A90DEEF8}"/>
               </a:ext>
             </a:extLst>
           </p:cNvPr>
@@ -9459,7 +9459,7 @@
         </p:nvSpPr>
         <p:spPr>
           <a:xfrm>
-            <a:off x="4545327" y="4029468"/>
+            <a:off x="4545327" y="4320416"/>
             <a:ext cx="3134256" cy="1061829"/>
           </a:xfrm>
           <a:prstGeom prst="rect">
@@ -9524,10 +9524,10 @@
       </p:sp>
       <p:sp>
         <p:nvSpPr>
-          <p:cNvPr id="38" name="矩形 66">
+          <p:cNvPr id="24" name="矩形 66">
             <a:extLst>
               <a:ext uri="{FF2B5EF4-FFF2-40B4-BE49-F238E27FC236}">
-                <a16:creationId xmlns:a16="http://schemas.microsoft.com/office/drawing/2014/main" id="{B04E74DC-AAC3-5095-BA84-4203DF4BDED3}"/>
+                <a16:creationId xmlns:a16="http://schemas.microsoft.com/office/drawing/2014/main" id="{B37B59DA-A754-2B3E-300F-459E1AB45C9E}"/>
               </a:ext>
             </a:extLst>
           </p:cNvPr>
@@ -9536,7 +9536,7 @@
         </p:nvSpPr>
         <p:spPr>
           <a:xfrm>
-            <a:off x="4545327" y="5092315"/>
+            <a:off x="4545327" y="5383263"/>
             <a:ext cx="3296897" cy="646331"/>
           </a:xfrm>
           <a:prstGeom prst="rect">
@@ -10036,10 +10036,10 @@
       </p:sp>
       <p:sp>
         <p:nvSpPr>
-          <p:cNvPr id="39" name="矩形 38">
+          <p:cNvPr id="25" name="矩形 24">
             <a:extLst>
               <a:ext uri="{FF2B5EF4-FFF2-40B4-BE49-F238E27FC236}">
-                <a16:creationId xmlns:a16="http://schemas.microsoft.com/office/drawing/2014/main" id="{B262FA92-AACC-04D8-3517-5509B29482A9}"/>
+                <a16:creationId xmlns:a16="http://schemas.microsoft.com/office/drawing/2014/main" id="{3B94699C-B29C-EED6-5948-DFD98022BACC}"/>
               </a:ext>
             </a:extLst>
           </p:cNvPr>
@@ -10048,7 +10048,7 @@
         </p:nvSpPr>
         <p:spPr>
           <a:xfrm>
-            <a:off x="8961776" y="4001533"/>
+            <a:off x="8961776" y="4292481"/>
             <a:ext cx="2949485" cy="1774436"/>
           </a:xfrm>
           <a:prstGeom prst="rect">
@@ -10089,10 +10089,10 @@
       </p:sp>
       <p:sp>
         <p:nvSpPr>
-          <p:cNvPr id="40" name="文本框 39">
+          <p:cNvPr id="26" name="文本框 25">
             <a:extLst>
               <a:ext uri="{FF2B5EF4-FFF2-40B4-BE49-F238E27FC236}">
-                <a16:creationId xmlns:a16="http://schemas.microsoft.com/office/drawing/2014/main" id="{4EEC148A-7CB8-C29F-64A1-7FD979F64F25}"/>
+                <a16:creationId xmlns:a16="http://schemas.microsoft.com/office/drawing/2014/main" id="{C2D880F0-B436-FD5B-DE75-69372858FFBE}"/>
               </a:ext>
             </a:extLst>
           </p:cNvPr>
@@ -10101,7 +10101,7 @@
         </p:nvSpPr>
         <p:spPr>
           <a:xfrm>
-            <a:off x="9034367" y="4029468"/>
+            <a:off x="9034367" y="4320416"/>
             <a:ext cx="3134256" cy="1338828"/>
           </a:xfrm>
           <a:prstGeom prst="rect">
@@ -10190,10 +10190,10 @@
       </p:sp>
       <p:sp>
         <p:nvSpPr>
-          <p:cNvPr id="41" name="矩形 66">
+          <p:cNvPr id="43" name="矩形 66">
             <a:extLst>
               <a:ext uri="{FF2B5EF4-FFF2-40B4-BE49-F238E27FC236}">
-                <a16:creationId xmlns:a16="http://schemas.microsoft.com/office/drawing/2014/main" id="{4CA15ADC-DAFC-0546-8D4F-0EDB453F2FDA}"/>
+                <a16:creationId xmlns:a16="http://schemas.microsoft.com/office/drawing/2014/main" id="{27B2367F-E48D-0E30-0C3F-B84922D6E873}"/>
               </a:ext>
             </a:extLst>
           </p:cNvPr>
@@ -10202,7 +10202,7 @@
         </p:nvSpPr>
         <p:spPr>
           <a:xfrm>
-            <a:off x="1373986" y="2064188"/>
+            <a:off x="1373986" y="2355136"/>
             <a:ext cx="1375671" cy="276999"/>
           </a:xfrm>
           <a:prstGeom prst="rect">
@@ -10260,10 +10260,10 @@
       </p:sp>
       <p:sp>
         <p:nvSpPr>
-          <p:cNvPr id="42" name="矩形 66">
+          <p:cNvPr id="44" name="矩形 66">
             <a:extLst>
               <a:ext uri="{FF2B5EF4-FFF2-40B4-BE49-F238E27FC236}">
-                <a16:creationId xmlns:a16="http://schemas.microsoft.com/office/drawing/2014/main" id="{14D79124-DFDC-7A0E-AD3D-6A04C114EA13}"/>
+                <a16:creationId xmlns:a16="http://schemas.microsoft.com/office/drawing/2014/main" id="{41C7093C-2FDA-2347-1ED9-7560852DD87F}"/>
               </a:ext>
             </a:extLst>
           </p:cNvPr>
@@ -10272,7 +10272,7 @@
         </p:nvSpPr>
         <p:spPr>
           <a:xfrm>
-            <a:off x="3446901" y="4729260"/>
+            <a:off x="3474609" y="5020208"/>
             <a:ext cx="1375671" cy="830997"/>
           </a:xfrm>
           <a:prstGeom prst="rect">
@@ -10369,10 +10369,10 @@
       </p:sp>
       <p:sp>
         <p:nvSpPr>
-          <p:cNvPr id="45" name="矩形 66">
+          <p:cNvPr id="46" name="矩形 66">
             <a:extLst>
               <a:ext uri="{FF2B5EF4-FFF2-40B4-BE49-F238E27FC236}">
-                <a16:creationId xmlns:a16="http://schemas.microsoft.com/office/drawing/2014/main" id="{6DBD09EC-5F54-F5CB-DB2C-9085428323CF}"/>
+                <a16:creationId xmlns:a16="http://schemas.microsoft.com/office/drawing/2014/main" id="{24447028-C244-D0F9-4413-6F1350946AA5}"/>
               </a:ext>
             </a:extLst>
           </p:cNvPr>
@@ -10381,7 +10381,7 @@
         </p:nvSpPr>
         <p:spPr>
           <a:xfrm>
-            <a:off x="5381484" y="3357243"/>
+            <a:off x="5381484" y="3777495"/>
             <a:ext cx="1896031" cy="276999"/>
           </a:xfrm>
           <a:prstGeom prst="rect">
@@ -10439,10 +10439,10 @@
       </p:sp>
       <p:sp>
         <p:nvSpPr>
-          <p:cNvPr id="47" name="矩形 66">
+          <p:cNvPr id="49" name="矩形 66">
             <a:extLst>
               <a:ext uri="{FF2B5EF4-FFF2-40B4-BE49-F238E27FC236}">
-                <a16:creationId xmlns:a16="http://schemas.microsoft.com/office/drawing/2014/main" id="{B6FD8A7F-68B7-86F2-A652-170EACC4BFC5}"/>
+                <a16:creationId xmlns:a16="http://schemas.microsoft.com/office/drawing/2014/main" id="{75EFDA45-2D4A-23FE-AA59-40F6B9C85479}"/>
               </a:ext>
             </a:extLst>
           </p:cNvPr>
@@ -10451,7 +10451,7 @@
         </p:nvSpPr>
         <p:spPr>
           <a:xfrm>
-            <a:off x="7940485" y="4729259"/>
+            <a:off x="7940485" y="5020207"/>
             <a:ext cx="1375671" cy="830997"/>
           </a:xfrm>
           <a:prstGeom prst="rect">
@@ -10548,10 +10548,10 @@
       </p:sp>
       <p:cxnSp>
         <p:nvCxnSpPr>
-          <p:cNvPr id="48" name="直接连接符 8">
+          <p:cNvPr id="51" name="直接连接符 8">
             <a:extLst>
               <a:ext uri="{FF2B5EF4-FFF2-40B4-BE49-F238E27FC236}">
-                <a16:creationId xmlns:a16="http://schemas.microsoft.com/office/drawing/2014/main" id="{12C84D89-333C-1927-B5C4-6582A4676D74}"/>
+                <a16:creationId xmlns:a16="http://schemas.microsoft.com/office/drawing/2014/main" id="{4AEE2B8A-3B73-44B9-C8B3-5768B571234E}"/>
               </a:ext>
             </a:extLst>
           </p:cNvPr>
@@ -10600,10 +10600,10 @@
       </p:cxnSp>
       <p:sp>
         <p:nvSpPr>
-          <p:cNvPr id="55" name="文本框 54">
+          <p:cNvPr id="52" name="文本框 51">
             <a:extLst>
               <a:ext uri="{FF2B5EF4-FFF2-40B4-BE49-F238E27FC236}">
-                <a16:creationId xmlns:a16="http://schemas.microsoft.com/office/drawing/2014/main" id="{8BE17588-52B6-EB86-CC6F-1834604A2F14}"/>
+                <a16:creationId xmlns:a16="http://schemas.microsoft.com/office/drawing/2014/main" id="{59C3F10E-9C5E-D398-380D-1F6FD9C83CB6}"/>
               </a:ext>
             </a:extLst>
           </p:cNvPr>
@@ -10711,6 +10711,843 @@
               <a:t>Infrastructures</a:t>
             </a:r>
             <a:endParaRPr kumimoji="1" lang="zh-CN" altLang="en-US" b="1" dirty="0"/>
+          </a:p>
+        </p:txBody>
+      </p:sp>
+      <p:sp>
+        <p:nvSpPr>
+          <p:cNvPr id="53" name="矩形 52">
+            <a:extLst>
+              <a:ext uri="{FF2B5EF4-FFF2-40B4-BE49-F238E27FC236}">
+                <a16:creationId xmlns:a16="http://schemas.microsoft.com/office/drawing/2014/main" id="{95355BA2-6F30-E114-3C83-79DE0987FD00}"/>
+              </a:ext>
+            </a:extLst>
+          </p:cNvPr>
+          <p:cNvSpPr/>
+          <p:nvPr/>
+        </p:nvSpPr>
+        <p:spPr>
+          <a:xfrm>
+            <a:off x="382952" y="113080"/>
+            <a:ext cx="10111865" cy="581057"/>
+          </a:xfrm>
+          <a:prstGeom prst="rect">
+            <a:avLst/>
+          </a:prstGeom>
+        </p:spPr>
+        <p:txBody>
+          <a:bodyPr wrap="square">
+            <a:spAutoFit/>
+          </a:bodyPr>
+          <a:lstStyle/>
+          <a:p>
+            <a:pPr marL="464400" indent="-464400" algn="just">
+              <a:lnSpc>
+                <a:spcPct val="150000"/>
+              </a:lnSpc>
+              <a:buFont typeface="Wingdings" panose="05000000000000000000" pitchFamily="2" charset="2"/>
+              <a:buChar char="Ø"/>
+            </a:pPr>
+            <a:r>
+              <a:rPr lang="en-US" altLang="zh-CN" sz="2400" b="1" dirty="0">
+                <a:latin typeface="微软雅黑" panose="020B0503020204020204" pitchFamily="34" charset="-122"/>
+              </a:rPr>
+              <a:t>Workflow</a:t>
+            </a:r>
+            <a:r>
+              <a:rPr lang="zh-CN" altLang="en-US" sz="2400" b="1" dirty="0">
+                <a:latin typeface="微软雅黑" panose="020B0503020204020204" pitchFamily="34" charset="-122"/>
+              </a:rPr>
+              <a:t> </a:t>
+            </a:r>
+            <a:r>
+              <a:rPr lang="en-US" altLang="zh-CN" sz="2400" b="1" dirty="0">
+                <a:latin typeface="微软雅黑" panose="020B0503020204020204" pitchFamily="34" charset="-122"/>
+              </a:rPr>
+              <a:t>for</a:t>
+            </a:r>
+            <a:r>
+              <a:rPr lang="zh-CN" altLang="en-US" sz="2400" b="1" dirty="0">
+                <a:latin typeface="微软雅黑" panose="020B0503020204020204" pitchFamily="34" charset="-122"/>
+              </a:rPr>
+              <a:t> </a:t>
+            </a:r>
+            <a:r>
+              <a:rPr lang="en-US" altLang="zh-CN" sz="2400" b="1" dirty="0">
+                <a:latin typeface="微软雅黑" panose="020B0503020204020204" pitchFamily="34" charset="-122"/>
+              </a:rPr>
+              <a:t>global</a:t>
+            </a:r>
+            <a:r>
+              <a:rPr lang="zh-CN" altLang="en-US" sz="2400" b="1" dirty="0">
+                <a:latin typeface="微软雅黑" panose="020B0503020204020204" pitchFamily="34" charset="-122"/>
+              </a:rPr>
+              <a:t> </a:t>
+            </a:r>
+            <a:r>
+              <a:rPr lang="en-US" altLang="zh-CN" sz="2400" b="1" dirty="0">
+                <a:latin typeface="微软雅黑" panose="020B0503020204020204" pitchFamily="34" charset="-122"/>
+              </a:rPr>
+              <a:t>3D</a:t>
+            </a:r>
+            <a:r>
+              <a:rPr lang="zh-CN" altLang="en-US" sz="2400" b="1" dirty="0">
+                <a:latin typeface="微软雅黑" panose="020B0503020204020204" pitchFamily="34" charset="-122"/>
+              </a:rPr>
+              <a:t> </a:t>
+            </a:r>
+            <a:r>
+              <a:rPr lang="en-US" altLang="zh-CN" sz="2400" b="1" dirty="0">
+                <a:latin typeface="微软雅黑" panose="020B0503020204020204" pitchFamily="34" charset="-122"/>
+              </a:rPr>
+              <a:t>building</a:t>
+            </a:r>
+            <a:r>
+              <a:rPr lang="zh-CN" altLang="en-US" sz="2400" b="1" dirty="0">
+                <a:latin typeface="微软雅黑" panose="020B0503020204020204" pitchFamily="34" charset="-122"/>
+              </a:rPr>
+              <a:t> </a:t>
+            </a:r>
+            <a:r>
+              <a:rPr lang="en-US" altLang="zh-CN" sz="2400" b="1" dirty="0">
+                <a:latin typeface="微软雅黑" panose="020B0503020204020204" pitchFamily="34" charset="-122"/>
+              </a:rPr>
+              <a:t>information</a:t>
+            </a:r>
+            <a:r>
+              <a:rPr lang="zh-CN" altLang="en-US" sz="2400" b="1" dirty="0">
+                <a:latin typeface="微软雅黑" panose="020B0503020204020204" pitchFamily="34" charset="-122"/>
+              </a:rPr>
+              <a:t> </a:t>
+            </a:r>
+            <a:r>
+              <a:rPr lang="en-US" altLang="zh-CN" sz="2400" b="1" dirty="0">
+                <a:latin typeface="微软雅黑" panose="020B0503020204020204" pitchFamily="34" charset="-122"/>
+              </a:rPr>
+              <a:t>mapping</a:t>
+            </a:r>
+          </a:p>
+        </p:txBody>
+      </p:sp>
+      <p:sp>
+        <p:nvSpPr>
+          <p:cNvPr id="54" name="文本框 53">
+            <a:extLst>
+              <a:ext uri="{FF2B5EF4-FFF2-40B4-BE49-F238E27FC236}">
+                <a16:creationId xmlns:a16="http://schemas.microsoft.com/office/drawing/2014/main" id="{B1F1DE48-5D6D-CD96-89EF-FBE42C7B456F}"/>
+              </a:ext>
+            </a:extLst>
+          </p:cNvPr>
+          <p:cNvSpPr txBox="1"/>
+          <p:nvPr/>
+        </p:nvSpPr>
+        <p:spPr>
+          <a:xfrm>
+            <a:off x="4580637" y="903076"/>
+            <a:ext cx="4239622" cy="784830"/>
+          </a:xfrm>
+          <a:prstGeom prst="rect">
+            <a:avLst/>
+          </a:prstGeom>
+          <a:noFill/>
+        </p:spPr>
+        <p:txBody>
+          <a:bodyPr wrap="none" rtlCol="0">
+            <a:spAutoFit/>
+          </a:bodyPr>
+          <a:lstStyle/>
+          <a:p>
+            <a:pPr marL="342900" indent="-342900">
+              <a:lnSpc>
+                <a:spcPct val="150000"/>
+              </a:lnSpc>
+              <a:buAutoNum type="arabicPeriod"/>
+            </a:pPr>
+            <a:r>
+              <a:rPr kumimoji="1" lang="en-US" altLang="zh-CN" b="1" dirty="0"/>
+              <a:t>Google</a:t>
+            </a:r>
+            <a:r>
+              <a:rPr kumimoji="1" lang="zh-CN" altLang="en-US" b="1" dirty="0"/>
+              <a:t> </a:t>
+            </a:r>
+            <a:r>
+              <a:rPr kumimoji="1" lang="en-US" altLang="zh-CN" b="1" dirty="0"/>
+              <a:t>Earth</a:t>
+            </a:r>
+            <a:r>
+              <a:rPr kumimoji="1" lang="zh-CN" altLang="en-US" b="1" dirty="0"/>
+              <a:t> </a:t>
+            </a:r>
+            <a:r>
+              <a:rPr kumimoji="1" lang="en-US" altLang="zh-CN" b="1" dirty="0"/>
+              <a:t>Engine</a:t>
+            </a:r>
+          </a:p>
+          <a:p>
+            <a:pPr marL="612000" lvl="1" indent="-342900">
+              <a:buFont typeface="+mj-lt"/>
+              <a:buAutoNum type="alphaLcPeriod"/>
+            </a:pPr>
+            <a:r>
+              <a:rPr kumimoji="1" lang="en-US" altLang="zh-CN" dirty="0"/>
+              <a:t>High</a:t>
+            </a:r>
+            <a:r>
+              <a:rPr kumimoji="1" lang="zh-CN" altLang="en-US" dirty="0"/>
+              <a:t> </a:t>
+            </a:r>
+            <a:r>
+              <a:rPr kumimoji="1" lang="en-US" altLang="zh-CN" dirty="0"/>
+              <a:t>Resolution</a:t>
+            </a:r>
+            <a:r>
+              <a:rPr kumimoji="1" lang="zh-CN" altLang="en-US" dirty="0"/>
+              <a:t> </a:t>
+            </a:r>
+            <a:r>
+              <a:rPr kumimoji="1" lang="en-US" altLang="zh-CN" dirty="0"/>
+              <a:t>Settlement</a:t>
+            </a:r>
+            <a:r>
+              <a:rPr kumimoji="1" lang="zh-CN" altLang="en-US" dirty="0"/>
+              <a:t> </a:t>
+            </a:r>
+            <a:r>
+              <a:rPr kumimoji="1" lang="en-US" altLang="zh-CN" dirty="0"/>
+              <a:t>Layer</a:t>
+            </a:r>
+          </a:p>
+        </p:txBody>
+      </p:sp>
+      <p:sp>
+        <p:nvSpPr>
+          <p:cNvPr id="56" name="矩形 55">
+            <a:extLst>
+              <a:ext uri="{FF2B5EF4-FFF2-40B4-BE49-F238E27FC236}">
+                <a16:creationId xmlns:a16="http://schemas.microsoft.com/office/drawing/2014/main" id="{C3C7B081-6F67-8C03-313E-C39785CFF722}"/>
+              </a:ext>
+            </a:extLst>
+          </p:cNvPr>
+          <p:cNvSpPr/>
+          <p:nvPr/>
+        </p:nvSpPr>
+        <p:spPr>
+          <a:xfrm>
+            <a:off x="4472736" y="845691"/>
+            <a:ext cx="4646455" cy="1298018"/>
+          </a:xfrm>
+          <a:prstGeom prst="rect">
+            <a:avLst/>
+          </a:prstGeom>
+          <a:noFill/>
+          <a:ln w="25400">
+            <a:solidFill>
+              <a:srgbClr val="01008E"/>
+            </a:solidFill>
+            <a:prstDash val="solid"/>
+          </a:ln>
+        </p:spPr>
+        <p:style>
+          <a:lnRef idx="2">
+            <a:schemeClr val="accent1">
+              <a:shade val="50000"/>
+            </a:schemeClr>
+          </a:lnRef>
+          <a:fillRef idx="1">
+            <a:schemeClr val="accent1"/>
+          </a:fillRef>
+          <a:effectRef idx="0">
+            <a:schemeClr val="accent1"/>
+          </a:effectRef>
+          <a:fontRef idx="minor">
+            <a:schemeClr val="lt1"/>
+          </a:fontRef>
+        </p:style>
+        <p:txBody>
+          <a:bodyPr rtlCol="0" anchor="ctr"/>
+          <a:lstStyle/>
+          <a:p>
+            <a:pPr algn="ctr"/>
+            <a:endParaRPr kumimoji="1" lang="zh-CN" altLang="en-US" sz="2400"/>
+          </a:p>
+        </p:txBody>
+      </p:sp>
+      <p:sp>
+        <p:nvSpPr>
+          <p:cNvPr id="57" name="右箭头 56">
+            <a:extLst>
+              <a:ext uri="{FF2B5EF4-FFF2-40B4-BE49-F238E27FC236}">
+                <a16:creationId xmlns:a16="http://schemas.microsoft.com/office/drawing/2014/main" id="{5E1299B7-8791-1E72-2324-70628B4FBDA6}"/>
+              </a:ext>
+            </a:extLst>
+          </p:cNvPr>
+          <p:cNvSpPr/>
+          <p:nvPr/>
+        </p:nvSpPr>
+        <p:spPr>
+          <a:xfrm flipH="1">
+            <a:off x="3457757" y="1308280"/>
+            <a:ext cx="952561" cy="339634"/>
+          </a:xfrm>
+          <a:prstGeom prst="rightArrow">
+            <a:avLst/>
+          </a:prstGeom>
+          <a:solidFill>
+            <a:schemeClr val="bg2">
+              <a:lumMod val="50000"/>
+            </a:schemeClr>
+          </a:solidFill>
+          <a:ln>
+            <a:solidFill>
+              <a:schemeClr val="bg2">
+                <a:lumMod val="50000"/>
+              </a:schemeClr>
+            </a:solidFill>
+          </a:ln>
+        </p:spPr>
+        <p:style>
+          <a:lnRef idx="2">
+            <a:schemeClr val="accent1">
+              <a:shade val="50000"/>
+            </a:schemeClr>
+          </a:lnRef>
+          <a:fillRef idx="1">
+            <a:schemeClr val="accent1"/>
+          </a:fillRef>
+          <a:effectRef idx="0">
+            <a:schemeClr val="accent1"/>
+          </a:effectRef>
+          <a:fontRef idx="minor">
+            <a:schemeClr val="lt1"/>
+          </a:fontRef>
+        </p:style>
+        <p:txBody>
+          <a:bodyPr rtlCol="0" anchor="ctr"/>
+          <a:lstStyle/>
+          <a:p>
+            <a:pPr algn="ctr"/>
+            <a:endParaRPr kumimoji="1" lang="zh-CN" altLang="en-US"/>
+          </a:p>
+        </p:txBody>
+      </p:sp>
+      <p:sp>
+        <p:nvSpPr>
+          <p:cNvPr id="58" name="矩形 66">
+            <a:extLst>
+              <a:ext uri="{FF2B5EF4-FFF2-40B4-BE49-F238E27FC236}">
+                <a16:creationId xmlns:a16="http://schemas.microsoft.com/office/drawing/2014/main" id="{53C62B86-BA6C-3BD2-23B3-48602247EB6E}"/>
+              </a:ext>
+            </a:extLst>
+          </p:cNvPr>
+          <p:cNvSpPr/>
+          <p:nvPr/>
+        </p:nvSpPr>
+        <p:spPr>
+          <a:xfrm>
+            <a:off x="3271412" y="1071559"/>
+            <a:ext cx="1375671" cy="830997"/>
+          </a:xfrm>
+          <a:prstGeom prst="rect">
+            <a:avLst/>
+          </a:prstGeom>
+        </p:spPr>
+        <p:txBody>
+          <a:bodyPr wrap="square">
+            <a:spAutoFit/>
+          </a:bodyPr>
+          <a:lstStyle/>
+          <a:p>
+            <a:pPr algn="ctr"/>
+            <a:r>
+              <a:rPr lang="en-US" altLang="zh-CN" sz="1200" b="1" kern="0" dirty="0">
+                <a:solidFill>
+                  <a:schemeClr val="bg2">
+                    <a:lumMod val="50000"/>
+                  </a:schemeClr>
+                </a:solidFill>
+                <a:latin typeface="Microsoft YaHei" panose="020B0503020204020204" pitchFamily="34" charset="-122"/>
+                <a:ea typeface="Microsoft YaHei" panose="020B0503020204020204" pitchFamily="34" charset="-122"/>
+                <a:cs typeface="Times New Roman" panose="02020603050405020304" pitchFamily="18" charset="0"/>
+              </a:rPr>
+              <a:t>region</a:t>
+            </a:r>
+          </a:p>
+          <a:p>
+            <a:pPr algn="ctr"/>
+            <a:endParaRPr lang="en-US" altLang="zh-CN" sz="1200" b="1" kern="0" dirty="0">
+              <a:solidFill>
+                <a:schemeClr val="bg2">
+                  <a:lumMod val="50000"/>
+                </a:schemeClr>
+              </a:solidFill>
+              <a:latin typeface="Microsoft YaHei" panose="020B0503020204020204" pitchFamily="34" charset="-122"/>
+              <a:ea typeface="Microsoft YaHei" panose="020B0503020204020204" pitchFamily="34" charset="-122"/>
+              <a:cs typeface="Times New Roman" panose="02020603050405020304" pitchFamily="18" charset="0"/>
+            </a:endParaRPr>
+          </a:p>
+          <a:p>
+            <a:pPr algn="ctr"/>
+            <a:endParaRPr lang="en-US" altLang="zh-CN" sz="1200" b="1" kern="0" dirty="0">
+              <a:solidFill>
+                <a:schemeClr val="bg2">
+                  <a:lumMod val="50000"/>
+                </a:schemeClr>
+              </a:solidFill>
+              <a:latin typeface="Microsoft YaHei" panose="020B0503020204020204" pitchFamily="34" charset="-122"/>
+              <a:ea typeface="Microsoft YaHei" panose="020B0503020204020204" pitchFamily="34" charset="-122"/>
+              <a:cs typeface="Times New Roman" panose="02020603050405020304" pitchFamily="18" charset="0"/>
+            </a:endParaRPr>
+          </a:p>
+          <a:p>
+            <a:pPr algn="ctr"/>
+            <a:r>
+              <a:rPr lang="en-US" altLang="zh-CN" sz="1200" b="1" kern="0" dirty="0">
+                <a:solidFill>
+                  <a:schemeClr val="bg2">
+                    <a:lumMod val="50000"/>
+                  </a:schemeClr>
+                </a:solidFill>
+                <a:latin typeface="Microsoft YaHei" panose="020B0503020204020204" pitchFamily="34" charset="-122"/>
+                <a:ea typeface="Microsoft YaHei" panose="020B0503020204020204" pitchFamily="34" charset="-122"/>
+                <a:cs typeface="Times New Roman" panose="02020603050405020304" pitchFamily="18" charset="0"/>
+              </a:rPr>
+              <a:t>selection</a:t>
+            </a:r>
+          </a:p>
+        </p:txBody>
+      </p:sp>
+      <p:sp>
+        <p:nvSpPr>
+          <p:cNvPr id="59" name="矩形 66">
+            <a:extLst>
+              <a:ext uri="{FF2B5EF4-FFF2-40B4-BE49-F238E27FC236}">
+                <a16:creationId xmlns:a16="http://schemas.microsoft.com/office/drawing/2014/main" id="{3D5D9FB8-EBD1-9432-A6F6-96E930CC5F25}"/>
+              </a:ext>
+            </a:extLst>
+          </p:cNvPr>
+          <p:cNvSpPr/>
+          <p:nvPr/>
+        </p:nvSpPr>
+        <p:spPr>
+          <a:xfrm>
+            <a:off x="4511233" y="1657194"/>
+            <a:ext cx="4523134" cy="461665"/>
+          </a:xfrm>
+          <a:prstGeom prst="rect">
+            <a:avLst/>
+          </a:prstGeom>
+        </p:spPr>
+        <p:txBody>
+          <a:bodyPr wrap="square">
+            <a:spAutoFit/>
+          </a:bodyPr>
+          <a:lstStyle/>
+          <a:p>
+            <a:pPr algn="just"/>
+            <a:r>
+              <a:rPr lang="en-US" altLang="zh-CN" sz="1200" b="1" kern="0" dirty="0">
+                <a:solidFill>
+                  <a:schemeClr val="bg2">
+                    <a:lumMod val="75000"/>
+                  </a:schemeClr>
+                </a:solidFill>
+                <a:latin typeface="Microsoft YaHei" panose="020B0503020204020204" pitchFamily="34" charset="-122"/>
+                <a:ea typeface="Microsoft YaHei" panose="020B0503020204020204" pitchFamily="34" charset="-122"/>
+                <a:cs typeface="Times New Roman" panose="02020603050405020304" pitchFamily="18" charset="0"/>
+              </a:rPr>
+              <a:t>Note:</a:t>
+            </a:r>
+            <a:r>
+              <a:rPr lang="zh-CN" altLang="en-US" sz="1200" b="1" kern="0" dirty="0">
+                <a:solidFill>
+                  <a:schemeClr val="bg2">
+                    <a:lumMod val="75000"/>
+                  </a:schemeClr>
+                </a:solidFill>
+                <a:latin typeface="Microsoft YaHei" panose="020B0503020204020204" pitchFamily="34" charset="-122"/>
+                <a:ea typeface="Microsoft YaHei" panose="020B0503020204020204" pitchFamily="34" charset="-122"/>
+                <a:cs typeface="Times New Roman" panose="02020603050405020304" pitchFamily="18" charset="0"/>
+              </a:rPr>
+              <a:t> </a:t>
+            </a:r>
+            <a:r>
+              <a:rPr lang="en-US" altLang="zh-CN" sz="1200" b="1" kern="0" dirty="0">
+                <a:solidFill>
+                  <a:schemeClr val="bg2">
+                    <a:lumMod val="75000"/>
+                  </a:schemeClr>
+                </a:solidFill>
+                <a:latin typeface="Microsoft YaHei" panose="020B0503020204020204" pitchFamily="34" charset="-122"/>
+                <a:ea typeface="Microsoft YaHei" panose="020B0503020204020204" pitchFamily="34" charset="-122"/>
+                <a:cs typeface="Times New Roman" panose="02020603050405020304" pitchFamily="18" charset="0"/>
+              </a:rPr>
+              <a:t>The</a:t>
+            </a:r>
+            <a:r>
+              <a:rPr lang="zh-CN" altLang="en-US" sz="1200" b="1" kern="0" dirty="0">
+                <a:solidFill>
+                  <a:schemeClr val="bg2">
+                    <a:lumMod val="75000"/>
+                  </a:schemeClr>
+                </a:solidFill>
+                <a:latin typeface="Microsoft YaHei" panose="020B0503020204020204" pitchFamily="34" charset="-122"/>
+                <a:ea typeface="Microsoft YaHei" panose="020B0503020204020204" pitchFamily="34" charset="-122"/>
+                <a:cs typeface="Times New Roman" panose="02020603050405020304" pitchFamily="18" charset="0"/>
+              </a:rPr>
+              <a:t> </a:t>
+            </a:r>
+            <a:r>
+              <a:rPr lang="en-US" altLang="zh-CN" sz="1200" b="1" kern="0" dirty="0">
+                <a:solidFill>
+                  <a:schemeClr val="bg2">
+                    <a:lumMod val="75000"/>
+                  </a:schemeClr>
+                </a:solidFill>
+                <a:latin typeface="Microsoft YaHei" panose="020B0503020204020204" pitchFamily="34" charset="-122"/>
+                <a:ea typeface="Microsoft YaHei" panose="020B0503020204020204" pitchFamily="34" charset="-122"/>
+                <a:cs typeface="Times New Roman" panose="02020603050405020304" pitchFamily="18" charset="0"/>
+              </a:rPr>
+              <a:t>HRSL</a:t>
+            </a:r>
+            <a:r>
+              <a:rPr lang="zh-CN" altLang="en-US" sz="1200" b="1" kern="0" dirty="0">
+                <a:solidFill>
+                  <a:schemeClr val="bg2">
+                    <a:lumMod val="75000"/>
+                  </a:schemeClr>
+                </a:solidFill>
+                <a:latin typeface="Microsoft YaHei" panose="020B0503020204020204" pitchFamily="34" charset="-122"/>
+                <a:ea typeface="Microsoft YaHei" panose="020B0503020204020204" pitchFamily="34" charset="-122"/>
+                <a:cs typeface="Times New Roman" panose="02020603050405020304" pitchFamily="18" charset="0"/>
+              </a:rPr>
+              <a:t> </a:t>
+            </a:r>
+            <a:r>
+              <a:rPr lang="en-US" altLang="zh-CN" sz="1200" b="1" kern="0" dirty="0">
+                <a:solidFill>
+                  <a:schemeClr val="bg2">
+                    <a:lumMod val="75000"/>
+                  </a:schemeClr>
+                </a:solidFill>
+                <a:latin typeface="Microsoft YaHei" panose="020B0503020204020204" pitchFamily="34" charset="-122"/>
+                <a:ea typeface="Microsoft YaHei" panose="020B0503020204020204" pitchFamily="34" charset="-122"/>
+                <a:cs typeface="Times New Roman" panose="02020603050405020304" pitchFamily="18" charset="0"/>
+              </a:rPr>
+              <a:t>dataset</a:t>
+            </a:r>
+            <a:r>
+              <a:rPr lang="zh-CN" altLang="en-US" sz="1200" b="1" kern="0" dirty="0">
+                <a:solidFill>
+                  <a:schemeClr val="bg2">
+                    <a:lumMod val="75000"/>
+                  </a:schemeClr>
+                </a:solidFill>
+                <a:latin typeface="Microsoft YaHei" panose="020B0503020204020204" pitchFamily="34" charset="-122"/>
+                <a:ea typeface="Microsoft YaHei" panose="020B0503020204020204" pitchFamily="34" charset="-122"/>
+                <a:cs typeface="Times New Roman" panose="02020603050405020304" pitchFamily="18" charset="0"/>
+              </a:rPr>
+              <a:t> </a:t>
+            </a:r>
+            <a:r>
+              <a:rPr lang="en-US" altLang="zh-CN" sz="1200" b="1" kern="0" dirty="0">
+                <a:solidFill>
+                  <a:schemeClr val="bg2">
+                    <a:lumMod val="75000"/>
+                  </a:schemeClr>
+                </a:solidFill>
+                <a:latin typeface="Microsoft YaHei" panose="020B0503020204020204" pitchFamily="34" charset="-122"/>
+                <a:ea typeface="Microsoft YaHei" panose="020B0503020204020204" pitchFamily="34" charset="-122"/>
+                <a:cs typeface="Times New Roman" panose="02020603050405020304" pitchFamily="18" charset="0"/>
+              </a:rPr>
+              <a:t>includes</a:t>
+            </a:r>
+            <a:r>
+              <a:rPr lang="zh-CN" altLang="en-US" sz="1200" b="1" kern="0" dirty="0">
+                <a:solidFill>
+                  <a:schemeClr val="bg2">
+                    <a:lumMod val="75000"/>
+                  </a:schemeClr>
+                </a:solidFill>
+                <a:latin typeface="Microsoft YaHei" panose="020B0503020204020204" pitchFamily="34" charset="-122"/>
+                <a:ea typeface="Microsoft YaHei" panose="020B0503020204020204" pitchFamily="34" charset="-122"/>
+                <a:cs typeface="Times New Roman" panose="02020603050405020304" pitchFamily="18" charset="0"/>
+              </a:rPr>
+              <a:t> </a:t>
+            </a:r>
+            <a:r>
+              <a:rPr lang="en-US" altLang="zh-CN" sz="1200" b="1" kern="0" dirty="0">
+                <a:solidFill>
+                  <a:schemeClr val="bg2">
+                    <a:lumMod val="75000"/>
+                  </a:schemeClr>
+                </a:solidFill>
+                <a:latin typeface="Microsoft YaHei" panose="020B0503020204020204" pitchFamily="34" charset="-122"/>
+                <a:ea typeface="Microsoft YaHei" panose="020B0503020204020204" pitchFamily="34" charset="-122"/>
+                <a:cs typeface="Times New Roman" panose="02020603050405020304" pitchFamily="18" charset="0"/>
+              </a:rPr>
+              <a:t>the</a:t>
+            </a:r>
+            <a:r>
+              <a:rPr lang="zh-CN" altLang="en-US" sz="1200" b="1" kern="0" dirty="0">
+                <a:solidFill>
+                  <a:schemeClr val="bg2">
+                    <a:lumMod val="75000"/>
+                  </a:schemeClr>
+                </a:solidFill>
+                <a:latin typeface="Microsoft YaHei" panose="020B0503020204020204" pitchFamily="34" charset="-122"/>
+                <a:ea typeface="Microsoft YaHei" panose="020B0503020204020204" pitchFamily="34" charset="-122"/>
+                <a:cs typeface="Times New Roman" panose="02020603050405020304" pitchFamily="18" charset="0"/>
+              </a:rPr>
+              <a:t> </a:t>
+            </a:r>
+            <a:r>
+              <a:rPr lang="en-US" altLang="zh-CN" sz="1200" b="1" kern="0" dirty="0">
+                <a:solidFill>
+                  <a:schemeClr val="bg2">
+                    <a:lumMod val="75000"/>
+                  </a:schemeClr>
+                </a:solidFill>
+                <a:latin typeface="Microsoft YaHei" panose="020B0503020204020204" pitchFamily="34" charset="-122"/>
+                <a:ea typeface="Microsoft YaHei" panose="020B0503020204020204" pitchFamily="34" charset="-122"/>
+                <a:cs typeface="Times New Roman" panose="02020603050405020304" pitchFamily="18" charset="0"/>
+              </a:rPr>
+              <a:t>information</a:t>
+            </a:r>
+            <a:r>
+              <a:rPr lang="zh-CN" altLang="en-US" sz="1200" b="1" kern="0" dirty="0">
+                <a:solidFill>
+                  <a:schemeClr val="bg2">
+                    <a:lumMod val="75000"/>
+                  </a:schemeClr>
+                </a:solidFill>
+                <a:latin typeface="Microsoft YaHei" panose="020B0503020204020204" pitchFamily="34" charset="-122"/>
+                <a:ea typeface="Microsoft YaHei" panose="020B0503020204020204" pitchFamily="34" charset="-122"/>
+                <a:cs typeface="Times New Roman" panose="02020603050405020304" pitchFamily="18" charset="0"/>
+              </a:rPr>
+              <a:t> </a:t>
+            </a:r>
+            <a:r>
+              <a:rPr lang="en-US" altLang="zh-CN" sz="1200" b="1" kern="0" dirty="0">
+                <a:solidFill>
+                  <a:schemeClr val="bg2">
+                    <a:lumMod val="75000"/>
+                  </a:schemeClr>
+                </a:solidFill>
+                <a:latin typeface="Microsoft YaHei" panose="020B0503020204020204" pitchFamily="34" charset="-122"/>
+                <a:ea typeface="Microsoft YaHei" panose="020B0503020204020204" pitchFamily="34" charset="-122"/>
+                <a:cs typeface="Times New Roman" panose="02020603050405020304" pitchFamily="18" charset="0"/>
+              </a:rPr>
+              <a:t>of</a:t>
+            </a:r>
+            <a:r>
+              <a:rPr lang="zh-CN" altLang="en-US" sz="1200" b="1" kern="0" dirty="0">
+                <a:solidFill>
+                  <a:schemeClr val="bg2">
+                    <a:lumMod val="75000"/>
+                  </a:schemeClr>
+                </a:solidFill>
+                <a:latin typeface="Microsoft YaHei" panose="020B0503020204020204" pitchFamily="34" charset="-122"/>
+                <a:ea typeface="Microsoft YaHei" panose="020B0503020204020204" pitchFamily="34" charset="-122"/>
+                <a:cs typeface="Times New Roman" panose="02020603050405020304" pitchFamily="18" charset="0"/>
+              </a:rPr>
+              <a:t> </a:t>
+            </a:r>
+            <a:r>
+              <a:rPr lang="en-US" altLang="zh-CN" sz="1200" b="1" kern="0" dirty="0">
+                <a:solidFill>
+                  <a:schemeClr val="bg2">
+                    <a:lumMod val="75000"/>
+                  </a:schemeClr>
+                </a:solidFill>
+                <a:latin typeface="Microsoft YaHei" panose="020B0503020204020204" pitchFamily="34" charset="-122"/>
+                <a:ea typeface="Microsoft YaHei" panose="020B0503020204020204" pitchFamily="34" charset="-122"/>
+                <a:cs typeface="Times New Roman" panose="02020603050405020304" pitchFamily="18" charset="0"/>
+              </a:rPr>
+              <a:t>human</a:t>
+            </a:r>
+            <a:r>
+              <a:rPr lang="zh-CN" altLang="en-US" sz="1200" b="1" kern="0" dirty="0">
+                <a:solidFill>
+                  <a:schemeClr val="bg2">
+                    <a:lumMod val="75000"/>
+                  </a:schemeClr>
+                </a:solidFill>
+                <a:latin typeface="Microsoft YaHei" panose="020B0503020204020204" pitchFamily="34" charset="-122"/>
+                <a:ea typeface="Microsoft YaHei" panose="020B0503020204020204" pitchFamily="34" charset="-122"/>
+                <a:cs typeface="Times New Roman" panose="02020603050405020304" pitchFamily="18" charset="0"/>
+              </a:rPr>
+              <a:t> </a:t>
+            </a:r>
+            <a:r>
+              <a:rPr lang="en-US" altLang="zh-CN" sz="1200" b="1" kern="0" dirty="0">
+                <a:solidFill>
+                  <a:schemeClr val="bg2">
+                    <a:lumMod val="75000"/>
+                  </a:schemeClr>
+                </a:solidFill>
+                <a:latin typeface="Microsoft YaHei" panose="020B0503020204020204" pitchFamily="34" charset="-122"/>
+                <a:ea typeface="Microsoft YaHei" panose="020B0503020204020204" pitchFamily="34" charset="-122"/>
+                <a:cs typeface="Times New Roman" panose="02020603050405020304" pitchFamily="18" charset="0"/>
+              </a:rPr>
+              <a:t>population</a:t>
+            </a:r>
+            <a:r>
+              <a:rPr lang="zh-CN" altLang="en-US" sz="1200" b="1" kern="0" dirty="0">
+                <a:solidFill>
+                  <a:schemeClr val="bg2">
+                    <a:lumMod val="75000"/>
+                  </a:schemeClr>
+                </a:solidFill>
+                <a:latin typeface="Microsoft YaHei" panose="020B0503020204020204" pitchFamily="34" charset="-122"/>
+                <a:ea typeface="Microsoft YaHei" panose="020B0503020204020204" pitchFamily="34" charset="-122"/>
+                <a:cs typeface="Times New Roman" panose="02020603050405020304" pitchFamily="18" charset="0"/>
+              </a:rPr>
+              <a:t> </a:t>
+            </a:r>
+            <a:r>
+              <a:rPr lang="en-US" altLang="zh-CN" sz="1200" b="1" kern="0" dirty="0">
+                <a:solidFill>
+                  <a:schemeClr val="bg2">
+                    <a:lumMod val="75000"/>
+                  </a:schemeClr>
+                </a:solidFill>
+                <a:latin typeface="Microsoft YaHei" panose="020B0503020204020204" pitchFamily="34" charset="-122"/>
+                <a:ea typeface="Microsoft YaHei" panose="020B0503020204020204" pitchFamily="34" charset="-122"/>
+                <a:cs typeface="Times New Roman" panose="02020603050405020304" pitchFamily="18" charset="0"/>
+              </a:rPr>
+              <a:t>at</a:t>
+            </a:r>
+            <a:r>
+              <a:rPr lang="zh-CN" altLang="en-US" sz="1200" b="1" kern="0" dirty="0">
+                <a:solidFill>
+                  <a:schemeClr val="bg2">
+                    <a:lumMod val="75000"/>
+                  </a:schemeClr>
+                </a:solidFill>
+                <a:latin typeface="Microsoft YaHei" panose="020B0503020204020204" pitchFamily="34" charset="-122"/>
+                <a:ea typeface="Microsoft YaHei" panose="020B0503020204020204" pitchFamily="34" charset="-122"/>
+                <a:cs typeface="Times New Roman" panose="02020603050405020304" pitchFamily="18" charset="0"/>
+              </a:rPr>
+              <a:t> </a:t>
+            </a:r>
+            <a:r>
+              <a:rPr lang="en-US" altLang="zh-CN" sz="1200" b="1" kern="0" dirty="0">
+                <a:solidFill>
+                  <a:schemeClr val="bg2">
+                    <a:lumMod val="75000"/>
+                  </a:schemeClr>
+                </a:solidFill>
+                <a:latin typeface="Microsoft YaHei" panose="020B0503020204020204" pitchFamily="34" charset="-122"/>
+                <a:ea typeface="Microsoft YaHei" panose="020B0503020204020204" pitchFamily="34" charset="-122"/>
+                <a:cs typeface="Times New Roman" panose="02020603050405020304" pitchFamily="18" charset="0"/>
+              </a:rPr>
+              <a:t>a</a:t>
+            </a:r>
+            <a:r>
+              <a:rPr lang="zh-CN" altLang="en-US" sz="1200" b="1" kern="0" dirty="0">
+                <a:solidFill>
+                  <a:schemeClr val="bg2">
+                    <a:lumMod val="75000"/>
+                  </a:schemeClr>
+                </a:solidFill>
+                <a:latin typeface="Microsoft YaHei" panose="020B0503020204020204" pitchFamily="34" charset="-122"/>
+                <a:ea typeface="Microsoft YaHei" panose="020B0503020204020204" pitchFamily="34" charset="-122"/>
+                <a:cs typeface="Times New Roman" panose="02020603050405020304" pitchFamily="18" charset="0"/>
+              </a:rPr>
+              <a:t> </a:t>
+            </a:r>
+            <a:r>
+              <a:rPr lang="en-US" altLang="zh-CN" sz="1200" b="1" kern="0" dirty="0">
+                <a:solidFill>
+                  <a:schemeClr val="bg2">
+                    <a:lumMod val="75000"/>
+                  </a:schemeClr>
+                </a:solidFill>
+                <a:latin typeface="Microsoft YaHei" panose="020B0503020204020204" pitchFamily="34" charset="-122"/>
+                <a:ea typeface="Microsoft YaHei" panose="020B0503020204020204" pitchFamily="34" charset="-122"/>
+                <a:cs typeface="Times New Roman" panose="02020603050405020304" pitchFamily="18" charset="0"/>
+              </a:rPr>
+              <a:t>resolution</a:t>
+            </a:r>
+            <a:r>
+              <a:rPr lang="zh-CN" altLang="en-US" sz="1200" b="1" kern="0" dirty="0">
+                <a:solidFill>
+                  <a:schemeClr val="bg2">
+                    <a:lumMod val="75000"/>
+                  </a:schemeClr>
+                </a:solidFill>
+                <a:latin typeface="Microsoft YaHei" panose="020B0503020204020204" pitchFamily="34" charset="-122"/>
+                <a:ea typeface="Microsoft YaHei" panose="020B0503020204020204" pitchFamily="34" charset="-122"/>
+                <a:cs typeface="Times New Roman" panose="02020603050405020304" pitchFamily="18" charset="0"/>
+              </a:rPr>
+              <a:t> </a:t>
+            </a:r>
+            <a:r>
+              <a:rPr lang="en-US" altLang="zh-CN" sz="1200" b="1" kern="0" dirty="0">
+                <a:solidFill>
+                  <a:schemeClr val="bg2">
+                    <a:lumMod val="75000"/>
+                  </a:schemeClr>
+                </a:solidFill>
+                <a:latin typeface="Microsoft YaHei" panose="020B0503020204020204" pitchFamily="34" charset="-122"/>
+                <a:ea typeface="Microsoft YaHei" panose="020B0503020204020204" pitchFamily="34" charset="-122"/>
+                <a:cs typeface="Times New Roman" panose="02020603050405020304" pitchFamily="18" charset="0"/>
+              </a:rPr>
+              <a:t>of</a:t>
+            </a:r>
+            <a:r>
+              <a:rPr lang="zh-CN" altLang="en-US" sz="1200" b="1" kern="0" dirty="0">
+                <a:solidFill>
+                  <a:schemeClr val="bg2">
+                    <a:lumMod val="75000"/>
+                  </a:schemeClr>
+                </a:solidFill>
+                <a:latin typeface="Microsoft YaHei" panose="020B0503020204020204" pitchFamily="34" charset="-122"/>
+                <a:ea typeface="Microsoft YaHei" panose="020B0503020204020204" pitchFamily="34" charset="-122"/>
+                <a:cs typeface="Times New Roman" panose="02020603050405020304" pitchFamily="18" charset="0"/>
+              </a:rPr>
+              <a:t> </a:t>
+            </a:r>
+            <a:r>
+              <a:rPr lang="en-US" altLang="zh-CN" sz="1200" b="1" kern="0" dirty="0">
+                <a:solidFill>
+                  <a:schemeClr val="bg2">
+                    <a:lumMod val="75000"/>
+                  </a:schemeClr>
+                </a:solidFill>
+                <a:latin typeface="Microsoft YaHei" panose="020B0503020204020204" pitchFamily="34" charset="-122"/>
+                <a:ea typeface="Microsoft YaHei" panose="020B0503020204020204" pitchFamily="34" charset="-122"/>
+                <a:cs typeface="Times New Roman" panose="02020603050405020304" pitchFamily="18" charset="0"/>
+              </a:rPr>
+              <a:t>30</a:t>
+            </a:r>
+            <a:r>
+              <a:rPr lang="zh-CN" altLang="en-US" sz="1200" b="1" kern="0" dirty="0">
+                <a:solidFill>
+                  <a:schemeClr val="bg2">
+                    <a:lumMod val="75000"/>
+                  </a:schemeClr>
+                </a:solidFill>
+                <a:latin typeface="Microsoft YaHei" panose="020B0503020204020204" pitchFamily="34" charset="-122"/>
+                <a:ea typeface="Microsoft YaHei" panose="020B0503020204020204" pitchFamily="34" charset="-122"/>
+                <a:cs typeface="Times New Roman" panose="02020603050405020304" pitchFamily="18" charset="0"/>
+              </a:rPr>
+              <a:t> </a:t>
+            </a:r>
+            <a:r>
+              <a:rPr lang="en-US" altLang="zh-CN" sz="1200" b="1" kern="0" dirty="0">
+                <a:solidFill>
+                  <a:schemeClr val="bg2">
+                    <a:lumMod val="75000"/>
+                  </a:schemeClr>
+                </a:solidFill>
+                <a:latin typeface="Microsoft YaHei" panose="020B0503020204020204" pitchFamily="34" charset="-122"/>
+                <a:ea typeface="Microsoft YaHei" panose="020B0503020204020204" pitchFamily="34" charset="-122"/>
+                <a:cs typeface="Times New Roman" panose="02020603050405020304" pitchFamily="18" charset="0"/>
+              </a:rPr>
+              <a:t>m.</a:t>
+            </a:r>
           </a:p>
         </p:txBody>
       </p:sp>

</xml_diff>